<commit_message>
Add files related to identifying outlier designs
</commit_message>
<xml_diff>
--- a/figures/dms_supp.pptx
+++ b/figures/dms_supp.pptx
@@ -243,7 +243,7 @@
           <a:p>
             <a:fld id="{F1DDF71F-782B-3943-BE66-0C4691DAE615}" type="datetimeFigureOut">
               <a:rPr lang="en-US" smtClean="0"/>
-              <a:t>4/19/25</a:t>
+              <a:t>5/24/25</a:t>
             </a:fld>
             <a:endParaRPr lang="en-US"/>
           </a:p>
@@ -413,7 +413,7 @@
           <a:p>
             <a:fld id="{F1DDF71F-782B-3943-BE66-0C4691DAE615}" type="datetimeFigureOut">
               <a:rPr lang="en-US" smtClean="0"/>
-              <a:t>4/19/25</a:t>
+              <a:t>5/24/25</a:t>
             </a:fld>
             <a:endParaRPr lang="en-US"/>
           </a:p>
@@ -593,7 +593,7 @@
           <a:p>
             <a:fld id="{F1DDF71F-782B-3943-BE66-0C4691DAE615}" type="datetimeFigureOut">
               <a:rPr lang="en-US" smtClean="0"/>
-              <a:t>4/19/25</a:t>
+              <a:t>5/24/25</a:t>
             </a:fld>
             <a:endParaRPr lang="en-US"/>
           </a:p>
@@ -763,7 +763,7 @@
           <a:p>
             <a:fld id="{F1DDF71F-782B-3943-BE66-0C4691DAE615}" type="datetimeFigureOut">
               <a:rPr lang="en-US" smtClean="0"/>
-              <a:t>4/19/25</a:t>
+              <a:t>5/24/25</a:t>
             </a:fld>
             <a:endParaRPr lang="en-US"/>
           </a:p>
@@ -1009,7 +1009,7 @@
           <a:p>
             <a:fld id="{F1DDF71F-782B-3943-BE66-0C4691DAE615}" type="datetimeFigureOut">
               <a:rPr lang="en-US" smtClean="0"/>
-              <a:t>4/19/25</a:t>
+              <a:t>5/24/25</a:t>
             </a:fld>
             <a:endParaRPr lang="en-US"/>
           </a:p>
@@ -1241,7 +1241,7 @@
           <a:p>
             <a:fld id="{F1DDF71F-782B-3943-BE66-0C4691DAE615}" type="datetimeFigureOut">
               <a:rPr lang="en-US" smtClean="0"/>
-              <a:t>4/19/25</a:t>
+              <a:t>5/24/25</a:t>
             </a:fld>
             <a:endParaRPr lang="en-US"/>
           </a:p>
@@ -1608,7 +1608,7 @@
           <a:p>
             <a:fld id="{F1DDF71F-782B-3943-BE66-0C4691DAE615}" type="datetimeFigureOut">
               <a:rPr lang="en-US" smtClean="0"/>
-              <a:t>4/19/25</a:t>
+              <a:t>5/24/25</a:t>
             </a:fld>
             <a:endParaRPr lang="en-US"/>
           </a:p>
@@ -1726,7 +1726,7 @@
           <a:p>
             <a:fld id="{F1DDF71F-782B-3943-BE66-0C4691DAE615}" type="datetimeFigureOut">
               <a:rPr lang="en-US" smtClean="0"/>
-              <a:t>4/19/25</a:t>
+              <a:t>5/24/25</a:t>
             </a:fld>
             <a:endParaRPr lang="en-US"/>
           </a:p>
@@ -1821,7 +1821,7 @@
           <a:p>
             <a:fld id="{F1DDF71F-782B-3943-BE66-0C4691DAE615}" type="datetimeFigureOut">
               <a:rPr lang="en-US" smtClean="0"/>
-              <a:t>4/19/25</a:t>
+              <a:t>5/24/25</a:t>
             </a:fld>
             <a:endParaRPr lang="en-US"/>
           </a:p>
@@ -2098,7 +2098,7 @@
           <a:p>
             <a:fld id="{F1DDF71F-782B-3943-BE66-0C4691DAE615}" type="datetimeFigureOut">
               <a:rPr lang="en-US" smtClean="0"/>
-              <a:t>4/19/25</a:t>
+              <a:t>5/24/25</a:t>
             </a:fld>
             <a:endParaRPr lang="en-US"/>
           </a:p>
@@ -2355,7 +2355,7 @@
           <a:p>
             <a:fld id="{F1DDF71F-782B-3943-BE66-0C4691DAE615}" type="datetimeFigureOut">
               <a:rPr lang="en-US" smtClean="0"/>
-              <a:t>4/19/25</a:t>
+              <a:t>5/24/25</a:t>
             </a:fld>
             <a:endParaRPr lang="en-US"/>
           </a:p>
@@ -2568,7 +2568,7 @@
           <a:p>
             <a:fld id="{F1DDF71F-782B-3943-BE66-0C4691DAE615}" type="datetimeFigureOut">
               <a:rPr lang="en-US" smtClean="0"/>
-              <a:t>4/19/25</a:t>
+              <a:t>5/24/25</a:t>
             </a:fld>
             <a:endParaRPr lang="en-US"/>
           </a:p>
@@ -2975,10 +2975,10 @@
       </p:grpSpPr>
       <p:pic>
         <p:nvPicPr>
-          <p:cNvPr id="1026" name="Picture 2">
+          <p:cNvPr id="2" name="Picture 2">
             <a:extLst>
               <a:ext uri="{FF2B5EF4-FFF2-40B4-BE49-F238E27FC236}">
-                <a16:creationId xmlns:a16="http://schemas.microsoft.com/office/drawing/2014/main" id="{D4B9FCAD-8E31-A11A-C6D1-35CB3AB718EA}"/>
+                <a16:creationId xmlns:a16="http://schemas.microsoft.com/office/drawing/2014/main" id="{BFDCDB2B-348D-33C8-2106-8D43B88C5066}"/>
               </a:ext>
             </a:extLst>
           </p:cNvPr>
@@ -3002,8 +3002,8 @@
         </p:blipFill>
         <p:spPr bwMode="auto">
           <a:xfrm>
-            <a:off x="3549760" y="3124915"/>
-            <a:ext cx="2297870" cy="1555318"/>
+            <a:off x="205848" y="73678"/>
+            <a:ext cx="3822085" cy="2721466"/>
           </a:xfrm>
           <a:prstGeom prst="rect">
             <a:avLst/>
@@ -3022,10 +3022,10 @@
       </p:pic>
       <p:pic>
         <p:nvPicPr>
-          <p:cNvPr id="4" name="Picture 64">
+          <p:cNvPr id="1026" name="Picture 2">
             <a:extLst>
               <a:ext uri="{FF2B5EF4-FFF2-40B4-BE49-F238E27FC236}">
-                <a16:creationId xmlns:a16="http://schemas.microsoft.com/office/drawing/2014/main" id="{69D22FD5-06DD-89B0-969A-0FEF228C01E8}"/>
+                <a16:creationId xmlns:a16="http://schemas.microsoft.com/office/drawing/2014/main" id="{D4B9FCAD-8E31-A11A-C6D1-35CB3AB718EA}"/>
               </a:ext>
             </a:extLst>
           </p:cNvPr>
@@ -3049,8 +3049,8 @@
         </p:blipFill>
         <p:spPr bwMode="auto">
           <a:xfrm>
-            <a:off x="146991" y="3021097"/>
-            <a:ext cx="3054523" cy="1523726"/>
+            <a:off x="3549760" y="3124915"/>
+            <a:ext cx="2297870" cy="1555318"/>
           </a:xfrm>
           <a:prstGeom prst="rect">
             <a:avLst/>
@@ -3069,10 +3069,10 @@
       </p:pic>
       <p:pic>
         <p:nvPicPr>
-          <p:cNvPr id="5" name="Picture 4">
+          <p:cNvPr id="4" name="Picture 64">
             <a:extLst>
               <a:ext uri="{FF2B5EF4-FFF2-40B4-BE49-F238E27FC236}">
-                <a16:creationId xmlns:a16="http://schemas.microsoft.com/office/drawing/2014/main" id="{E07EB837-7C58-9F42-C725-E993FBDC3FBA}"/>
+                <a16:creationId xmlns:a16="http://schemas.microsoft.com/office/drawing/2014/main" id="{69D22FD5-06DD-89B0-969A-0FEF228C01E8}"/>
               </a:ext>
             </a:extLst>
           </p:cNvPr>
@@ -3096,8 +3096,8 @@
         </p:blipFill>
         <p:spPr bwMode="auto">
           <a:xfrm>
-            <a:off x="2565466" y="4792166"/>
-            <a:ext cx="1836147" cy="1354744"/>
+            <a:off x="146991" y="3021097"/>
+            <a:ext cx="3054523" cy="1523726"/>
           </a:xfrm>
           <a:prstGeom prst="rect">
             <a:avLst/>
@@ -3114,88 +3114,12 @@
           </a:extLst>
         </p:spPr>
       </p:pic>
-      <p:sp>
-        <p:nvSpPr>
-          <p:cNvPr id="6" name="TextBox 5">
+      <p:pic>
+        <p:nvPicPr>
+          <p:cNvPr id="5" name="Picture 4">
             <a:extLst>
               <a:ext uri="{FF2B5EF4-FFF2-40B4-BE49-F238E27FC236}">
-                <a16:creationId xmlns:a16="http://schemas.microsoft.com/office/drawing/2014/main" id="{E55D5E4A-87C2-5139-E103-37F0F9E2864A}"/>
-              </a:ext>
-            </a:extLst>
-          </p:cNvPr>
-          <p:cNvSpPr txBox="1"/>
-          <p:nvPr/>
-        </p:nvSpPr>
-        <p:spPr>
-          <a:xfrm>
-            <a:off x="-10266" y="2952036"/>
-            <a:ext cx="314510" cy="307777"/>
-          </a:xfrm>
-          <a:prstGeom prst="rect">
-            <a:avLst/>
-          </a:prstGeom>
-          <a:noFill/>
-        </p:spPr>
-        <p:txBody>
-          <a:bodyPr wrap="none" rtlCol="0">
-            <a:spAutoFit/>
-          </a:bodyPr>
-          <a:lstStyle/>
-          <a:p>
-            <a:r>
-              <a:rPr lang="en-US" sz="1400" b="1" dirty="0">
-                <a:latin typeface="Arial" panose="020B0604020202020204" pitchFamily="34" charset="0"/>
-                <a:cs typeface="Arial" panose="020B0604020202020204" pitchFamily="34" charset="0"/>
-              </a:rPr>
-              <a:t>C</a:t>
-            </a:r>
-          </a:p>
-        </p:txBody>
-      </p:sp>
-      <p:sp>
-        <p:nvSpPr>
-          <p:cNvPr id="7" name="TextBox 6">
-            <a:extLst>
-              <a:ext uri="{FF2B5EF4-FFF2-40B4-BE49-F238E27FC236}">
-                <a16:creationId xmlns:a16="http://schemas.microsoft.com/office/drawing/2014/main" id="{64CCFC18-102C-17AC-E843-F17F418AA9A5}"/>
-              </a:ext>
-            </a:extLst>
-          </p:cNvPr>
-          <p:cNvSpPr txBox="1"/>
-          <p:nvPr/>
-        </p:nvSpPr>
-        <p:spPr>
-          <a:xfrm>
-            <a:off x="0" y="4636828"/>
-            <a:ext cx="304892" cy="307777"/>
-          </a:xfrm>
-          <a:prstGeom prst="rect">
-            <a:avLst/>
-          </a:prstGeom>
-          <a:noFill/>
-        </p:spPr>
-        <p:txBody>
-          <a:bodyPr wrap="none" rtlCol="0">
-            <a:spAutoFit/>
-          </a:bodyPr>
-          <a:lstStyle/>
-          <a:p>
-            <a:r>
-              <a:rPr lang="en-US" sz="1400" b="1" dirty="0">
-                <a:latin typeface="Arial" panose="020B0604020202020204" pitchFamily="34" charset="0"/>
-                <a:cs typeface="Arial" panose="020B0604020202020204" pitchFamily="34" charset="0"/>
-              </a:rPr>
-              <a:t>E</a:t>
-            </a:r>
-          </a:p>
-        </p:txBody>
-      </p:sp>
-      <p:pic>
-        <p:nvPicPr>
-          <p:cNvPr id="8" name="Picture 8">
-            <a:extLst>
-              <a:ext uri="{FF2B5EF4-FFF2-40B4-BE49-F238E27FC236}">
-                <a16:creationId xmlns:a16="http://schemas.microsoft.com/office/drawing/2014/main" id="{B896F650-C2FD-C8CF-FD45-07E9913BD284}"/>
+                <a16:creationId xmlns:a16="http://schemas.microsoft.com/office/drawing/2014/main" id="{E07EB837-7C58-9F42-C725-E993FBDC3FBA}"/>
               </a:ext>
             </a:extLst>
           </p:cNvPr>
@@ -3219,6 +3143,129 @@
         </p:blipFill>
         <p:spPr bwMode="auto">
           <a:xfrm>
+            <a:off x="2565466" y="4792166"/>
+            <a:ext cx="1836147" cy="1354744"/>
+          </a:xfrm>
+          <a:prstGeom prst="rect">
+            <a:avLst/>
+          </a:prstGeom>
+          <a:noFill/>
+          <a:extLst>
+            <a:ext uri="{909E8E84-426E-40DD-AFC4-6F175D3DCCD1}">
+              <a14:hiddenFill xmlns:a14="http://schemas.microsoft.com/office/drawing/2010/main">
+                <a:solidFill>
+                  <a:srgbClr val="FFFFFF"/>
+                </a:solidFill>
+              </a14:hiddenFill>
+            </a:ext>
+          </a:extLst>
+        </p:spPr>
+      </p:pic>
+      <p:sp>
+        <p:nvSpPr>
+          <p:cNvPr id="6" name="TextBox 5">
+            <a:extLst>
+              <a:ext uri="{FF2B5EF4-FFF2-40B4-BE49-F238E27FC236}">
+                <a16:creationId xmlns:a16="http://schemas.microsoft.com/office/drawing/2014/main" id="{E55D5E4A-87C2-5139-E103-37F0F9E2864A}"/>
+              </a:ext>
+            </a:extLst>
+          </p:cNvPr>
+          <p:cNvSpPr txBox="1"/>
+          <p:nvPr/>
+        </p:nvSpPr>
+        <p:spPr>
+          <a:xfrm>
+            <a:off x="-10266" y="2952036"/>
+            <a:ext cx="314510" cy="307777"/>
+          </a:xfrm>
+          <a:prstGeom prst="rect">
+            <a:avLst/>
+          </a:prstGeom>
+          <a:noFill/>
+        </p:spPr>
+        <p:txBody>
+          <a:bodyPr wrap="none" rtlCol="0">
+            <a:spAutoFit/>
+          </a:bodyPr>
+          <a:lstStyle/>
+          <a:p>
+            <a:r>
+              <a:rPr lang="en-US" sz="1400" b="1" dirty="0">
+                <a:latin typeface="Arial" panose="020B0604020202020204" pitchFamily="34" charset="0"/>
+                <a:cs typeface="Arial" panose="020B0604020202020204" pitchFamily="34" charset="0"/>
+              </a:rPr>
+              <a:t>C</a:t>
+            </a:r>
+          </a:p>
+        </p:txBody>
+      </p:sp>
+      <p:sp>
+        <p:nvSpPr>
+          <p:cNvPr id="7" name="TextBox 6">
+            <a:extLst>
+              <a:ext uri="{FF2B5EF4-FFF2-40B4-BE49-F238E27FC236}">
+                <a16:creationId xmlns:a16="http://schemas.microsoft.com/office/drawing/2014/main" id="{64CCFC18-102C-17AC-E843-F17F418AA9A5}"/>
+              </a:ext>
+            </a:extLst>
+          </p:cNvPr>
+          <p:cNvSpPr txBox="1"/>
+          <p:nvPr/>
+        </p:nvSpPr>
+        <p:spPr>
+          <a:xfrm>
+            <a:off x="0" y="4636828"/>
+            <a:ext cx="304892" cy="307777"/>
+          </a:xfrm>
+          <a:prstGeom prst="rect">
+            <a:avLst/>
+          </a:prstGeom>
+          <a:noFill/>
+        </p:spPr>
+        <p:txBody>
+          <a:bodyPr wrap="none" rtlCol="0">
+            <a:spAutoFit/>
+          </a:bodyPr>
+          <a:lstStyle/>
+          <a:p>
+            <a:r>
+              <a:rPr lang="en-US" sz="1400" b="1" dirty="0">
+                <a:latin typeface="Arial" panose="020B0604020202020204" pitchFamily="34" charset="0"/>
+                <a:cs typeface="Arial" panose="020B0604020202020204" pitchFamily="34" charset="0"/>
+              </a:rPr>
+              <a:t>E</a:t>
+            </a:r>
+          </a:p>
+        </p:txBody>
+      </p:sp>
+      <p:pic>
+        <p:nvPicPr>
+          <p:cNvPr id="8" name="Picture 8">
+            <a:extLst>
+              <a:ext uri="{FF2B5EF4-FFF2-40B4-BE49-F238E27FC236}">
+                <a16:creationId xmlns:a16="http://schemas.microsoft.com/office/drawing/2014/main" id="{B896F650-C2FD-C8CF-FD45-07E9913BD284}"/>
+              </a:ext>
+            </a:extLst>
+          </p:cNvPr>
+          <p:cNvPicPr>
+            <a:picLocks noChangeAspect="1" noChangeArrowheads="1"/>
+          </p:cNvPicPr>
+          <p:nvPr/>
+        </p:nvPicPr>
+        <p:blipFill>
+          <a:blip r:embed="rId6">
+            <a:extLst>
+              <a:ext uri="{28A0092B-C50C-407E-A947-70E740481C1C}">
+                <a14:useLocalDpi xmlns:a14="http://schemas.microsoft.com/office/drawing/2010/main" val="0"/>
+              </a:ext>
+            </a:extLst>
+          </a:blip>
+          <a:srcRect/>
+          <a:stretch>
+            <a:fillRect/>
+          </a:stretch>
+        </p:blipFill>
+        <p:spPr bwMode="auto">
+          <a:xfrm>
             <a:off x="333976" y="4790714"/>
             <a:ext cx="1836147" cy="1354744"/>
           </a:xfrm>
@@ -3328,7 +3375,7 @@
           <p:nvPr/>
         </p:nvPicPr>
         <p:blipFill>
-          <a:blip r:embed="rId6">
+          <a:blip r:embed="rId7">
             <a:extLst>
               <a:ext uri="{28A0092B-C50C-407E-A947-70E740481C1C}">
                 <a14:useLocalDpi xmlns:a14="http://schemas.microsoft.com/office/drawing/2010/main" val="0"/>
@@ -3764,53 +3811,6 @@
           </a:fontRef>
         </p:style>
       </p:cxnSp>
-      <p:pic>
-        <p:nvPicPr>
-          <p:cNvPr id="22" name="Picture 24">
-            <a:extLst>
-              <a:ext uri="{FF2B5EF4-FFF2-40B4-BE49-F238E27FC236}">
-                <a16:creationId xmlns:a16="http://schemas.microsoft.com/office/drawing/2014/main" id="{E0E682F3-3239-414E-57F2-A111D3F69206}"/>
-              </a:ext>
-            </a:extLst>
-          </p:cNvPr>
-          <p:cNvPicPr>
-            <a:picLocks noChangeAspect="1" noChangeArrowheads="1"/>
-          </p:cNvPicPr>
-          <p:nvPr/>
-        </p:nvPicPr>
-        <p:blipFill>
-          <a:blip r:embed="rId7">
-            <a:extLst>
-              <a:ext uri="{28A0092B-C50C-407E-A947-70E740481C1C}">
-                <a14:useLocalDpi xmlns:a14="http://schemas.microsoft.com/office/drawing/2010/main" val="0"/>
-              </a:ext>
-            </a:extLst>
-          </a:blip>
-          <a:srcRect/>
-          <a:stretch>
-            <a:fillRect/>
-          </a:stretch>
-        </p:blipFill>
-        <p:spPr bwMode="auto">
-          <a:xfrm>
-            <a:off x="215474" y="73679"/>
-            <a:ext cx="3822084" cy="2721465"/>
-          </a:xfrm>
-          <a:prstGeom prst="rect">
-            <a:avLst/>
-          </a:prstGeom>
-          <a:noFill/>
-          <a:extLst>
-            <a:ext uri="{909E8E84-426E-40DD-AFC4-6F175D3DCCD1}">
-              <a14:hiddenFill xmlns:a14="http://schemas.microsoft.com/office/drawing/2010/main">
-                <a:solidFill>
-                  <a:srgbClr val="FFFFFF"/>
-                </a:solidFill>
-              </a14:hiddenFill>
-            </a:ext>
-          </a:extLst>
-        </p:spPr>
-      </p:pic>
     </p:spTree>
     <p:extLst>
       <p:ext uri="{BB962C8B-B14F-4D97-AF65-F5344CB8AC3E}">

</xml_diff>